<commit_message>
Updated class feedback ppt
</commit_message>
<xml_diff>
--- a/Week_4_functions/Lab_4_functions/Notes/class_feedback_p1.pptx
+++ b/Week_4_functions/Lab_4_functions/Notes/class_feedback_p1.pptx
@@ -108,7 +108,41 @@
       </a:defRPr>
     </a:lvl9pPr>
   </p:defaultTextStyle>
+  <p:extLst>
+    <p:ext uri="{EFAFB233-063F-42B5-8137-9DF3F51BA10A}">
+      <p15:sldGuideLst xmlns:p15="http://schemas.microsoft.com/office/powerpoint/2012/main"/>
+    </p:ext>
+  </p:extLst>
 </p:presentation>
+</file>
+
+<file path=ppt/changesInfos/changesInfo1.xml><?xml version="1.0" encoding="utf-8"?>
+<pc:chgInfo xmlns:a="http://schemas.openxmlformats.org/drawingml/2006/main" xmlns:r="http://schemas.openxmlformats.org/officeDocument/2006/relationships" xmlns:ac="http://schemas.microsoft.com/office/drawing/2013/main/command" xmlns:pc="http://schemas.microsoft.com/office/powerpoint/2013/main/command">
+  <pc:docChgLst>
+    <pc:chgData name="Martin Garrad" userId="29fa8137-b5d4-4adf-94e3-55aca812c4da" providerId="ADAL" clId="{FE7E3326-2F4E-5A39-AD8A-48BAAAFC5A20}"/>
+    <pc:docChg chg="modSld">
+      <pc:chgData name="Martin Garrad" userId="29fa8137-b5d4-4adf-94e3-55aca812c4da" providerId="ADAL" clId="{FE7E3326-2F4E-5A39-AD8A-48BAAAFC5A20}" dt="2025-10-16T09:54:29.643" v="5" actId="20577"/>
+      <pc:docMkLst>
+        <pc:docMk/>
+      </pc:docMkLst>
+      <pc:sldChg chg="modSp mod">
+        <pc:chgData name="Martin Garrad" userId="29fa8137-b5d4-4adf-94e3-55aca812c4da" providerId="ADAL" clId="{FE7E3326-2F4E-5A39-AD8A-48BAAAFC5A20}" dt="2025-10-16T09:54:29.643" v="5" actId="20577"/>
+        <pc:sldMkLst>
+          <pc:docMk/>
+          <pc:sldMk cId="891917443" sldId="258"/>
+        </pc:sldMkLst>
+        <pc:spChg chg="mod">
+          <ac:chgData name="Martin Garrad" userId="29fa8137-b5d4-4adf-94e3-55aca812c4da" providerId="ADAL" clId="{FE7E3326-2F4E-5A39-AD8A-48BAAAFC5A20}" dt="2025-10-16T09:54:29.643" v="5" actId="20577"/>
+          <ac:spMkLst>
+            <pc:docMk/>
+            <pc:sldMk cId="891917443" sldId="258"/>
+            <ac:spMk id="6" creationId="{B3F95B9A-9D81-46BF-8C52-5AD5135B194F}"/>
+          </ac:spMkLst>
+        </pc:spChg>
+      </pc:sldChg>
+    </pc:docChg>
+  </pc:docChgLst>
+</pc:chgInfo>
 </file>
 
 <file path=ppt/slideLayouts/slideLayout1.xml><?xml version="1.0" encoding="utf-8"?>
@@ -260,7 +294,7 @@
           <a:p>
             <a:fld id="{833D10A3-DE19-134E-BCD6-CB10F3183C39}" type="datetimeFigureOut">
               <a:rPr lang="en-US" smtClean="0"/>
-              <a:t>10/13/25</a:t>
+              <a:t>10/14/25</a:t>
             </a:fld>
             <a:endParaRPr lang="en-US"/>
           </a:p>
@@ -460,7 +494,7 @@
           <a:p>
             <a:fld id="{833D10A3-DE19-134E-BCD6-CB10F3183C39}" type="datetimeFigureOut">
               <a:rPr lang="en-US" smtClean="0"/>
-              <a:t>10/13/25</a:t>
+              <a:t>10/14/25</a:t>
             </a:fld>
             <a:endParaRPr lang="en-US"/>
           </a:p>
@@ -670,7 +704,7 @@
           <a:p>
             <a:fld id="{833D10A3-DE19-134E-BCD6-CB10F3183C39}" type="datetimeFigureOut">
               <a:rPr lang="en-US" smtClean="0"/>
-              <a:t>10/13/25</a:t>
+              <a:t>10/14/25</a:t>
             </a:fld>
             <a:endParaRPr lang="en-US"/>
           </a:p>
@@ -870,7 +904,7 @@
           <a:p>
             <a:fld id="{833D10A3-DE19-134E-BCD6-CB10F3183C39}" type="datetimeFigureOut">
               <a:rPr lang="en-US" smtClean="0"/>
-              <a:t>10/13/25</a:t>
+              <a:t>10/14/25</a:t>
             </a:fld>
             <a:endParaRPr lang="en-US"/>
           </a:p>
@@ -1146,7 +1180,7 @@
           <a:p>
             <a:fld id="{833D10A3-DE19-134E-BCD6-CB10F3183C39}" type="datetimeFigureOut">
               <a:rPr lang="en-US" smtClean="0"/>
-              <a:t>10/13/25</a:t>
+              <a:t>10/14/25</a:t>
             </a:fld>
             <a:endParaRPr lang="en-US"/>
           </a:p>
@@ -1414,7 +1448,7 @@
           <a:p>
             <a:fld id="{833D10A3-DE19-134E-BCD6-CB10F3183C39}" type="datetimeFigureOut">
               <a:rPr lang="en-US" smtClean="0"/>
-              <a:t>10/13/25</a:t>
+              <a:t>10/14/25</a:t>
             </a:fld>
             <a:endParaRPr lang="en-US"/>
           </a:p>
@@ -1829,7 +1863,7 @@
           <a:p>
             <a:fld id="{833D10A3-DE19-134E-BCD6-CB10F3183C39}" type="datetimeFigureOut">
               <a:rPr lang="en-US" smtClean="0"/>
-              <a:t>10/13/25</a:t>
+              <a:t>10/14/25</a:t>
             </a:fld>
             <a:endParaRPr lang="en-US"/>
           </a:p>
@@ -1971,7 +2005,7 @@
           <a:p>
             <a:fld id="{833D10A3-DE19-134E-BCD6-CB10F3183C39}" type="datetimeFigureOut">
               <a:rPr lang="en-US" smtClean="0"/>
-              <a:t>10/13/25</a:t>
+              <a:t>10/14/25</a:t>
             </a:fld>
             <a:endParaRPr lang="en-US"/>
           </a:p>
@@ -2084,7 +2118,7 @@
           <a:p>
             <a:fld id="{833D10A3-DE19-134E-BCD6-CB10F3183C39}" type="datetimeFigureOut">
               <a:rPr lang="en-US" smtClean="0"/>
-              <a:t>10/13/25</a:t>
+              <a:t>10/14/25</a:t>
             </a:fld>
             <a:endParaRPr lang="en-US"/>
           </a:p>
@@ -2397,7 +2431,7 @@
           <a:p>
             <a:fld id="{833D10A3-DE19-134E-BCD6-CB10F3183C39}" type="datetimeFigureOut">
               <a:rPr lang="en-US" smtClean="0"/>
-              <a:t>10/13/25</a:t>
+              <a:t>10/14/25</a:t>
             </a:fld>
             <a:endParaRPr lang="en-US"/>
           </a:p>
@@ -2686,7 +2720,7 @@
           <a:p>
             <a:fld id="{833D10A3-DE19-134E-BCD6-CB10F3183C39}" type="datetimeFigureOut">
               <a:rPr lang="en-US" smtClean="0"/>
-              <a:t>10/13/25</a:t>
+              <a:t>10/14/25</a:t>
             </a:fld>
             <a:endParaRPr lang="en-US"/>
           </a:p>
@@ -2929,7 +2963,7 @@
           <a:p>
             <a:fld id="{833D10A3-DE19-134E-BCD6-CB10F3183C39}" type="datetimeFigureOut">
               <a:rPr lang="en-US" smtClean="0"/>
-              <a:t>10/13/25</a:t>
+              <a:t>10/14/25</a:t>
             </a:fld>
             <a:endParaRPr lang="en-US"/>
           </a:p>
@@ -3624,7 +3658,7 @@
         <p:spPr>
           <a:xfrm>
             <a:off x="838200" y="1690688"/>
-            <a:ext cx="10671629" cy="3046988"/>
+            <a:ext cx="10671629" cy="2677656"/>
           </a:xfrm>
           <a:prstGeom prst="rect">
             <a:avLst/>
@@ -3657,7 +3691,7 @@
           <a:p>
             <a:r>
               <a:rPr lang="en-US" sz="2400" dirty="0"/>
-              <a:t>Discuss this with someone in your group and then share your answers on </a:t>
+              <a:t>Share your answers on </a:t>
             </a:r>
             <a:r>
               <a:rPr lang="en-US" sz="2400" dirty="0" err="1"/>

</xml_diff>